<commit_message>
update be the computer for virtual
</commit_message>
<xml_diff>
--- a/Week05/BeTheComputer.pptx
+++ b/Week05/BeTheComputer.pptx
@@ -5,7 +5,7 @@
     <p:sldMasterId id="2147483648" r:id="rId1"/>
   </p:sldMasterIdLst>
   <p:notesMasterIdLst>
-    <p:notesMasterId r:id="rId21"/>
+    <p:notesMasterId r:id="rId20"/>
   </p:notesMasterIdLst>
   <p:sldIdLst>
     <p:sldId id="258" r:id="rId2"/>
@@ -24,9 +24,8 @@
     <p:sldId id="322" r:id="rId15"/>
     <p:sldId id="323" r:id="rId16"/>
     <p:sldId id="324" r:id="rId17"/>
-    <p:sldId id="325" r:id="rId18"/>
-    <p:sldId id="326" r:id="rId19"/>
-    <p:sldId id="327" r:id="rId20"/>
+    <p:sldId id="326" r:id="rId18"/>
+    <p:sldId id="327" r:id="rId19"/>
   </p:sldIdLst>
   <p:sldSz cx="12192000" cy="6858000"/>
   <p:notesSz cx="6858000" cy="9144000"/>
@@ -226,7 +225,7 @@
           <a:p>
             <a:fld id="{19104133-B5B0-4351-8158-4F0E5EB1E2BF}" type="datetimeFigureOut">
               <a:rPr lang="en-US" smtClean="0"/>
-              <a:t>3/25/2020</a:t>
+              <a:t>10/27/2020</a:t>
             </a:fld>
             <a:endParaRPr lang="en-US"/>
           </a:p>
@@ -1088,11 +1087,11 @@
           <a:p>
             <a:r>
               <a:rPr lang="en-US" dirty="0" smtClean="0"/>
-              <a:t>Students</a:t>
+              <a:t>All students should</a:t>
             </a:r>
             <a:r>
               <a:rPr lang="en-US" baseline="0" dirty="0" smtClean="0"/>
-              <a:t> should lower their hands</a:t>
+              <a:t> raise their right hands, glasses-wearing students should raise their left hands</a:t>
             </a:r>
             <a:endParaRPr lang="en-US" dirty="0"/>
           </a:p>
@@ -1124,7 +1123,7 @@
     </p:spTree>
     <p:extLst>
       <p:ext uri="{BB962C8B-B14F-4D97-AF65-F5344CB8AC3E}">
-        <p14:creationId xmlns:p14="http://schemas.microsoft.com/office/powerpoint/2010/main" val="3608041053"/>
+        <p14:creationId xmlns:p14="http://schemas.microsoft.com/office/powerpoint/2010/main" val="2336689811"/>
       </p:ext>
     </p:extLst>
   </p:cSld>
@@ -1135,98 +1134,6 @@
 </file>
 
 <file path=ppt/notesSlides/notesSlide16.xml><?xml version="1.0" encoding="utf-8"?>
-<p:notes xmlns:a="http://schemas.openxmlformats.org/drawingml/2006/main" xmlns:r="http://schemas.openxmlformats.org/officeDocument/2006/relationships" xmlns:p="http://schemas.openxmlformats.org/presentationml/2006/main">
-  <p:cSld>
-    <p:spTree>
-      <p:nvGrpSpPr>
-        <p:cNvPr id="1" name=""/>
-        <p:cNvGrpSpPr/>
-        <p:nvPr/>
-      </p:nvGrpSpPr>
-      <p:grpSpPr>
-        <a:xfrm>
-          <a:off x="0" y="0"/>
-          <a:ext cx="0" cy="0"/>
-          <a:chOff x="0" y="0"/>
-          <a:chExt cx="0" cy="0"/>
-        </a:xfrm>
-      </p:grpSpPr>
-      <p:sp>
-        <p:nvSpPr>
-          <p:cNvPr id="2" name="Slide Image Placeholder 1"/>
-          <p:cNvSpPr>
-            <a:spLocks noGrp="1" noRot="1" noChangeAspect="1"/>
-          </p:cNvSpPr>
-          <p:nvPr>
-            <p:ph type="sldImg"/>
-          </p:nvPr>
-        </p:nvSpPr>
-        <p:spPr/>
-      </p:sp>
-      <p:sp>
-        <p:nvSpPr>
-          <p:cNvPr id="3" name="Notes Placeholder 2"/>
-          <p:cNvSpPr>
-            <a:spLocks noGrp="1"/>
-          </p:cNvSpPr>
-          <p:nvPr>
-            <p:ph type="body" idx="1"/>
-          </p:nvPr>
-        </p:nvSpPr>
-        <p:spPr/>
-        <p:txBody>
-          <a:bodyPr/>
-          <a:lstStyle/>
-          <a:p>
-            <a:r>
-              <a:rPr lang="en-US" dirty="0" smtClean="0"/>
-              <a:t>All students should</a:t>
-            </a:r>
-            <a:r>
-              <a:rPr lang="en-US" baseline="0" dirty="0" smtClean="0"/>
-              <a:t> raise their right hands, glasses-wearing students should raise their left hands</a:t>
-            </a:r>
-            <a:endParaRPr lang="en-US" dirty="0"/>
-          </a:p>
-        </p:txBody>
-      </p:sp>
-      <p:sp>
-        <p:nvSpPr>
-          <p:cNvPr id="4" name="Slide Number Placeholder 3"/>
-          <p:cNvSpPr>
-            <a:spLocks noGrp="1"/>
-          </p:cNvSpPr>
-          <p:nvPr>
-            <p:ph type="sldNum" sz="quarter" idx="10"/>
-          </p:nvPr>
-        </p:nvSpPr>
-        <p:spPr/>
-        <p:txBody>
-          <a:bodyPr/>
-          <a:lstStyle/>
-          <a:p>
-            <a:fld id="{DEC8F7F9-57EC-49CF-9FCD-2B781E4B449F}" type="slidenum">
-              <a:rPr lang="en-US" smtClean="0"/>
-              <a:t>18</a:t>
-            </a:fld>
-            <a:endParaRPr lang="en-US"/>
-          </a:p>
-        </p:txBody>
-      </p:sp>
-    </p:spTree>
-    <p:extLst>
-      <p:ext uri="{BB962C8B-B14F-4D97-AF65-F5344CB8AC3E}">
-        <p14:creationId xmlns:p14="http://schemas.microsoft.com/office/powerpoint/2010/main" val="2336689811"/>
-      </p:ext>
-    </p:extLst>
-  </p:cSld>
-  <p:clrMapOvr>
-    <a:masterClrMapping/>
-  </p:clrMapOvr>
-</p:notes>
-</file>
-
-<file path=ppt/notesSlides/notesSlide17.xml><?xml version="1.0" encoding="utf-8"?>
 <p:notes xmlns:a="http://schemas.openxmlformats.org/drawingml/2006/main" xmlns:r="http://schemas.openxmlformats.org/officeDocument/2006/relationships" xmlns:p="http://schemas.openxmlformats.org/presentationml/2006/main">
   <p:cSld>
     <p:spTree>
@@ -1291,7 +1198,7 @@
           <a:p>
             <a:fld id="{DEC8F7F9-57EC-49CF-9FCD-2B781E4B449F}" type="slidenum">
               <a:rPr lang="en-US" smtClean="0"/>
-              <a:t>19</a:t>
+              <a:t>18</a:t>
             </a:fld>
             <a:endParaRPr lang="en-US"/>
           </a:p>
@@ -1645,7 +1552,11 @@
             </a:r>
             <a:r>
               <a:rPr lang="en-US" baseline="0" dirty="0" smtClean="0"/>
-              <a:t> should say “banana”</a:t>
+              <a:t> should say “banana</a:t>
+            </a:r>
+            <a:r>
+              <a:rPr lang="en-US" baseline="0" dirty="0" smtClean="0"/>
+              <a:t>” in the chat</a:t>
             </a:r>
             <a:endParaRPr lang="en-US" dirty="0"/>
           </a:p>
@@ -2245,7 +2156,7 @@
             <a:fld id="{1C2D31DE-C454-491C-B5C3-F097855E3DF7}" type="datetime4">
               <a:rPr lang="en-US" smtClean="0"/>
               <a:pPr/>
-              <a:t>March 25, 2020</a:t>
+              <a:t>October 27, 2020</a:t>
             </a:fld>
             <a:endParaRPr lang="en-US" dirty="0"/>
           </a:p>
@@ -5645,7 +5556,7 @@
           <a:p>
             <a:fld id="{5958763E-B898-436D-883D-03711491D54A}" type="datetimeFigureOut">
               <a:rPr lang="en-US" smtClean="0"/>
-              <a:t>3/25/2020</a:t>
+              <a:t>10/27/2020</a:t>
             </a:fld>
             <a:endParaRPr lang="en-US"/>
           </a:p>
@@ -5846,7 +5757,7 @@
           <a:p>
             <a:fld id="{5958763E-B898-436D-883D-03711491D54A}" type="datetimeFigureOut">
               <a:rPr lang="en-US" smtClean="0"/>
-              <a:t>3/25/2020</a:t>
+              <a:t>10/27/2020</a:t>
             </a:fld>
             <a:endParaRPr lang="en-US"/>
           </a:p>
@@ -6103,7 +6014,7 @@
           <a:p>
             <a:fld id="{5958763E-B898-436D-883D-03711491D54A}" type="datetimeFigureOut">
               <a:rPr lang="en-US" smtClean="0"/>
-              <a:t>3/25/2020</a:t>
+              <a:t>10/27/2020</a:t>
             </a:fld>
             <a:endParaRPr lang="en-US"/>
           </a:p>
@@ -6458,7 +6369,7 @@
           <a:p>
             <a:fld id="{5958763E-B898-436D-883D-03711491D54A}" type="datetimeFigureOut">
               <a:rPr lang="en-US" smtClean="0"/>
-              <a:t>3/25/2020</a:t>
+              <a:t>10/27/2020</a:t>
             </a:fld>
             <a:endParaRPr lang="en-US"/>
           </a:p>
@@ -6881,7 +6792,7 @@
           <a:p>
             <a:fld id="{5958763E-B898-436D-883D-03711491D54A}" type="datetimeFigureOut">
               <a:rPr lang="en-US" smtClean="0"/>
-              <a:t>3/25/2020</a:t>
+              <a:t>10/27/2020</a:t>
             </a:fld>
             <a:endParaRPr lang="en-US"/>
           </a:p>
@@ -7389,7 +7300,7 @@
           <a:p>
             <a:fld id="{5958763E-B898-436D-883D-03711491D54A}" type="datetimeFigureOut">
               <a:rPr lang="en-US" smtClean="0"/>
-              <a:t>3/25/2020</a:t>
+              <a:t>10/27/2020</a:t>
             </a:fld>
             <a:endParaRPr lang="en-US"/>
           </a:p>
@@ -7847,7 +7758,7 @@
           <a:p>
             <a:fld id="{5958763E-B898-436D-883D-03711491D54A}" type="datetimeFigureOut">
               <a:rPr lang="en-US" smtClean="0"/>
-              <a:t>3/25/2020</a:t>
+              <a:t>10/27/2020</a:t>
             </a:fld>
             <a:endParaRPr lang="en-US"/>
           </a:p>
@@ -8465,7 +8376,7 @@
           <a:p>
             <a:fld id="{5958763E-B898-436D-883D-03711491D54A}" type="datetimeFigureOut">
               <a:rPr lang="en-US" smtClean="0"/>
-              <a:t>3/25/2020</a:t>
+              <a:t>10/27/2020</a:t>
             </a:fld>
             <a:endParaRPr lang="en-US"/>
           </a:p>
@@ -9243,7 +9154,7 @@
           <a:p>
             <a:fld id="{5958763E-B898-436D-883D-03711491D54A}" type="datetimeFigureOut">
               <a:rPr lang="en-US" smtClean="0"/>
-              <a:t>3/25/2020</a:t>
+              <a:t>10/27/2020</a:t>
             </a:fld>
             <a:endParaRPr lang="en-US"/>
           </a:p>
@@ -9354,7 +9265,7 @@
           <a:p>
             <a:fld id="{5958763E-B898-436D-883D-03711491D54A}" type="datetimeFigureOut">
               <a:rPr lang="en-US" smtClean="0"/>
-              <a:t>3/25/2020</a:t>
+              <a:t>10/27/2020</a:t>
             </a:fld>
             <a:endParaRPr lang="en-US"/>
           </a:p>
@@ -9696,7 +9607,7 @@
             <a:fld id="{1C2D31DE-C454-491C-B5C3-F097855E3DF7}" type="datetime4">
               <a:rPr lang="en-US" smtClean="0"/>
               <a:pPr/>
-              <a:t>March 25, 2020</a:t>
+              <a:t>October 27, 2020</a:t>
             </a:fld>
             <a:endParaRPr lang="en-US" dirty="0"/>
           </a:p>
@@ -12856,7 +12767,7 @@
           <a:p>
             <a:fld id="{5958763E-B898-436D-883D-03711491D54A}" type="datetimeFigureOut">
               <a:rPr lang="en-US" smtClean="0"/>
-              <a:t>3/25/2020</a:t>
+              <a:t>10/27/2020</a:t>
             </a:fld>
             <a:endParaRPr lang="en-US"/>
           </a:p>
@@ -12987,7 +12898,7 @@
           <a:p>
             <a:fld id="{5958763E-B898-436D-883D-03711491D54A}" type="datetimeFigureOut">
               <a:rPr lang="en-US" smtClean="0"/>
-              <a:t>3/25/2020</a:t>
+              <a:t>10/27/2020</a:t>
             </a:fld>
             <a:endParaRPr lang="en-US"/>
           </a:p>
@@ -13118,7 +13029,7 @@
           <a:p>
             <a:fld id="{5958763E-B898-436D-883D-03711491D54A}" type="datetimeFigureOut">
               <a:rPr lang="en-US" smtClean="0"/>
-              <a:t>3/25/2020</a:t>
+              <a:t>10/27/2020</a:t>
             </a:fld>
             <a:endParaRPr lang="en-US"/>
           </a:p>
@@ -13249,7 +13160,7 @@
           <a:p>
             <a:fld id="{5958763E-B898-436D-883D-03711491D54A}" type="datetimeFigureOut">
               <a:rPr lang="en-US" smtClean="0"/>
-              <a:t>3/25/2020</a:t>
+              <a:t>10/27/2020</a:t>
             </a:fld>
             <a:endParaRPr lang="en-US"/>
           </a:p>
@@ -13380,7 +13291,7 @@
           <a:p>
             <a:fld id="{5958763E-B898-436D-883D-03711491D54A}" type="datetimeFigureOut">
               <a:rPr lang="en-US" smtClean="0"/>
-              <a:t>3/25/2020</a:t>
+              <a:t>10/27/2020</a:t>
             </a:fld>
             <a:endParaRPr lang="en-US"/>
           </a:p>
@@ -13511,7 +13422,7 @@
           <a:p>
             <a:fld id="{5958763E-B898-436D-883D-03711491D54A}" type="datetimeFigureOut">
               <a:rPr lang="en-US" smtClean="0"/>
-              <a:t>3/25/2020</a:t>
+              <a:t>10/27/2020</a:t>
             </a:fld>
             <a:endParaRPr lang="en-US"/>
           </a:p>
@@ -13642,7 +13553,7 @@
           <a:p>
             <a:fld id="{5958763E-B898-436D-883D-03711491D54A}" type="datetimeFigureOut">
               <a:rPr lang="en-US" smtClean="0"/>
-              <a:t>3/25/2020</a:t>
+              <a:t>10/27/2020</a:t>
             </a:fld>
             <a:endParaRPr lang="en-US"/>
           </a:p>
@@ -13773,7 +13684,7 @@
           <a:p>
             <a:fld id="{5958763E-B898-436D-883D-03711491D54A}" type="datetimeFigureOut">
               <a:rPr lang="en-US" smtClean="0"/>
-              <a:t>3/25/2020</a:t>
+              <a:t>10/27/2020</a:t>
             </a:fld>
             <a:endParaRPr lang="en-US"/>
           </a:p>
@@ -13913,7 +13824,7 @@
           <a:p>
             <a:fld id="{5958763E-B898-436D-883D-03711491D54A}" type="datetimeFigureOut">
               <a:rPr lang="en-US" smtClean="0"/>
-              <a:t>3/25/2020</a:t>
+              <a:t>10/27/2020</a:t>
             </a:fld>
             <a:endParaRPr lang="en-US"/>
           </a:p>
@@ -17274,7 +17185,7 @@
             <a:fld id="{1C2D31DE-C454-491C-B5C3-F097855E3DF7}" type="datetime4">
               <a:rPr lang="en-US" smtClean="0"/>
               <a:pPr/>
-              <a:t>March 25, 2020</a:t>
+              <a:t>October 27, 2020</a:t>
             </a:fld>
             <a:endParaRPr lang="en-US" dirty="0"/>
           </a:p>
@@ -29519,7 +29430,7 @@
           <a:p>
             <a:fld id="{5958763E-B898-436D-883D-03711491D54A}" type="datetimeFigureOut">
               <a:rPr lang="en-US" smtClean="0"/>
-              <a:t>3/25/2020</a:t>
+              <a:t>10/27/2020</a:t>
             </a:fld>
             <a:endParaRPr lang="en-US"/>
           </a:p>
@@ -29928,7 +29839,7 @@
           <a:p>
             <a:fld id="{5958763E-B898-436D-883D-03711491D54A}" type="datetimeFigureOut">
               <a:rPr lang="en-US" smtClean="0"/>
-              <a:t>3/25/2020</a:t>
+              <a:t>10/27/2020</a:t>
             </a:fld>
             <a:endParaRPr lang="en-US"/>
           </a:p>
@@ -30229,7 +30140,7 @@
           <a:p>
             <a:fld id="{5958763E-B898-436D-883D-03711491D54A}" type="datetimeFigureOut">
               <a:rPr lang="en-US" smtClean="0"/>
-              <a:t>3/25/2020</a:t>
+              <a:t>10/27/2020</a:t>
             </a:fld>
             <a:endParaRPr lang="en-US"/>
           </a:p>
@@ -30437,7 +30348,7 @@
           <a:p>
             <a:fld id="{5958763E-B898-436D-883D-03711491D54A}" type="datetimeFigureOut">
               <a:rPr lang="en-US" smtClean="0"/>
-              <a:t>3/25/2020</a:t>
+              <a:t>10/27/2020</a:t>
             </a:fld>
             <a:endParaRPr lang="en-US"/>
           </a:p>
@@ -30705,7 +30616,7 @@
           <a:p>
             <a:fld id="{5958763E-B898-436D-883D-03711491D54A}" type="datetimeFigureOut">
               <a:rPr lang="en-US" smtClean="0"/>
-              <a:t>3/25/2020</a:t>
+              <a:t>10/27/2020</a:t>
             </a:fld>
             <a:endParaRPr lang="en-US"/>
           </a:p>
@@ -31222,7 +31133,7 @@
           <a:p>
             <a:fld id="{5958763E-B898-436D-883D-03711491D54A}" type="datetimeFigureOut">
               <a:rPr lang="en-US" smtClean="0"/>
-              <a:t>3/25/2020</a:t>
+              <a:t>10/27/2020</a:t>
             </a:fld>
             <a:endParaRPr lang="en-US"/>
           </a:p>
@@ -31710,7 +31621,7 @@
           <a:p>
             <a:fld id="{5958763E-B898-436D-883D-03711491D54A}" type="datetimeFigureOut">
               <a:rPr lang="en-US" smtClean="0"/>
-              <a:t>3/25/2020</a:t>
+              <a:t>10/27/2020</a:t>
             </a:fld>
             <a:endParaRPr lang="en-US"/>
           </a:p>
@@ -32536,7 +32447,7 @@
           <a:p>
             <a:fld id="{5958763E-B898-436D-883D-03711491D54A}" type="datetimeFigureOut">
               <a:rPr lang="en-US" smtClean="0"/>
-              <a:t>3/25/2020</a:t>
+              <a:t>10/27/2020</a:t>
             </a:fld>
             <a:endParaRPr lang="en-US"/>
           </a:p>
@@ -32744,7 +32655,7 @@
           <a:p>
             <a:fld id="{5958763E-B898-436D-883D-03711491D54A}" type="datetimeFigureOut">
               <a:rPr lang="en-US" smtClean="0"/>
-              <a:t>3/25/2020</a:t>
+              <a:t>10/27/2020</a:t>
             </a:fld>
             <a:endParaRPr lang="en-US"/>
           </a:p>
@@ -33086,7 +32997,7 @@
           <a:p>
             <a:fld id="{5958763E-B898-436D-883D-03711491D54A}" type="datetimeFigureOut">
               <a:rPr lang="en-US" smtClean="0"/>
-              <a:t>3/25/2020</a:t>
+              <a:t>10/27/2020</a:t>
             </a:fld>
             <a:endParaRPr lang="en-US"/>
           </a:p>
@@ -33323,7 +33234,7 @@
           <a:p>
             <a:fld id="{5958763E-B898-436D-883D-03711491D54A}" type="datetimeFigureOut">
               <a:rPr lang="en-US" smtClean="0"/>
-              <a:t>3/25/2020</a:t>
+              <a:t>10/27/2020</a:t>
             </a:fld>
             <a:endParaRPr lang="en-US"/>
           </a:p>
@@ -33574,7 +33485,7 @@
           <a:p>
             <a:fld id="{5958763E-B898-436D-883D-03711491D54A}" type="datetimeFigureOut">
               <a:rPr lang="en-US" smtClean="0"/>
-              <a:t>3/25/2020</a:t>
+              <a:t>10/27/2020</a:t>
             </a:fld>
             <a:endParaRPr lang="en-US"/>
           </a:p>
@@ -37250,12 +37161,6 @@
               </a:rPr>
               <a:t>alert(x);</a:t>
             </a:r>
-            <a:endParaRPr lang="en-US" sz="7200" dirty="0">
-              <a:solidFill>
-                <a:srgbClr val="000000"/>
-              </a:solidFill>
-              <a:latin typeface="Consolas" panose="020B0609020204030204" pitchFamily="49" charset="0"/>
-            </a:endParaRPr>
           </a:p>
         </p:txBody>
       </p:sp>
@@ -37383,12 +37288,6 @@
               </a:rPr>
               <a:t>();</a:t>
             </a:r>
-            <a:endParaRPr lang="en-US" sz="7200" dirty="0">
-              <a:solidFill>
-                <a:srgbClr val="000000"/>
-              </a:solidFill>
-              <a:latin typeface="Consolas" panose="020B0609020204030204" pitchFamily="49" charset="0"/>
-            </a:endParaRPr>
           </a:p>
         </p:txBody>
       </p:sp>
@@ -37533,12 +37432,6 @@
               </a:rPr>
               <a:t>);</a:t>
             </a:r>
-            <a:endParaRPr lang="en-US" sz="7200" dirty="0">
-              <a:solidFill>
-                <a:srgbClr val="000000"/>
-              </a:solidFill>
-              <a:latin typeface="Consolas" panose="020B0609020204030204" pitchFamily="49" charset="0"/>
-            </a:endParaRPr>
           </a:p>
         </p:txBody>
       </p:sp>
@@ -37731,12 +37624,6 @@
               </a:rPr>
               <a:t>}</a:t>
             </a:r>
-            <a:endParaRPr lang="en-US" sz="7200" dirty="0">
-              <a:solidFill>
-                <a:srgbClr val="000000"/>
-              </a:solidFill>
-              <a:latin typeface="Consolas" panose="020B0609020204030204" pitchFamily="49" charset="0"/>
-            </a:endParaRPr>
           </a:p>
         </p:txBody>
       </p:sp>
@@ -37938,23 +37825,47 @@
               <a:t>	</a:t>
             </a:r>
             <a:r>
-              <a:rPr lang="en-US" sz="7200" dirty="0" err="1">
+              <a:rPr lang="en-US" sz="7200" dirty="0" smtClean="0">
                 <a:solidFill>
                   <a:srgbClr val="000000"/>
                 </a:solidFill>
                 <a:latin typeface="Consolas" panose="020B0609020204030204" pitchFamily="49" charset="0"/>
               </a:rPr>
-              <a:t>sitDown</a:t>
+              <a:t>alert(</a:t>
+            </a:r>
+            <a:r>
+              <a:rPr lang="en-US" sz="7200" dirty="0" smtClean="0">
+                <a:solidFill>
+                  <a:srgbClr val="A31515"/>
+                </a:solidFill>
+                <a:latin typeface="Consolas" panose="020B0609020204030204" pitchFamily="49" charset="0"/>
+              </a:rPr>
+              <a:t>"x is 8</a:t>
             </a:r>
             <a:r>
               <a:rPr lang="en-US" sz="7200" dirty="0">
+                <a:solidFill>
+                  <a:srgbClr val="A31515"/>
+                </a:solidFill>
+                <a:latin typeface="Consolas" panose="020B0609020204030204" pitchFamily="49" charset="0"/>
+              </a:rPr>
+              <a:t>"</a:t>
+            </a:r>
+            <a:r>
+              <a:rPr lang="en-US" sz="7200" dirty="0" smtClean="0">
                 <a:solidFill>
                   <a:srgbClr val="000000"/>
                 </a:solidFill>
                 <a:latin typeface="Consolas" panose="020B0609020204030204" pitchFamily="49" charset="0"/>
               </a:rPr>
-              <a:t>();</a:t>
+              <a:t>);</a:t>
             </a:r>
+            <a:endParaRPr lang="en-US" sz="7200" dirty="0">
+              <a:solidFill>
+                <a:srgbClr val="000000"/>
+              </a:solidFill>
+              <a:latin typeface="Consolas" panose="020B0609020204030204" pitchFamily="49" charset="0"/>
+            </a:endParaRPr>
           </a:p>
           <a:p>
             <a:r>
@@ -37966,12 +37877,6 @@
               </a:rPr>
               <a:t>}</a:t>
             </a:r>
-            <a:endParaRPr lang="en-US" sz="7200" dirty="0">
-              <a:solidFill>
-                <a:srgbClr val="000000"/>
-              </a:solidFill>
-              <a:latin typeface="Consolas" panose="020B0609020204030204" pitchFamily="49" charset="0"/>
-            </a:endParaRPr>
           </a:p>
         </p:txBody>
       </p:sp>
@@ -38181,12 +38086,6 @@
               </a:rPr>
               <a:t> + growth);</a:t>
             </a:r>
-            <a:endParaRPr lang="en-US" sz="5400" dirty="0">
-              <a:solidFill>
-                <a:srgbClr val="000000"/>
-              </a:solidFill>
-              <a:latin typeface="Consolas" panose="020B0609020204030204" pitchFamily="49" charset="0"/>
-            </a:endParaRPr>
           </a:p>
         </p:txBody>
       </p:sp>
@@ -38419,12 +38318,6 @@
               </a:rPr>
               <a:t>}</a:t>
             </a:r>
-            <a:endParaRPr lang="en-US" sz="5400" dirty="0">
-              <a:solidFill>
-                <a:srgbClr val="000000"/>
-              </a:solidFill>
-              <a:latin typeface="Consolas" panose="020B0609020204030204" pitchFamily="49" charset="0"/>
-            </a:endParaRPr>
           </a:p>
         </p:txBody>
       </p:sp>
@@ -38452,120 +38345,6 @@
 </file>
 
 <file path=ppt/slides/slide17.xml><?xml version="1.0" encoding="utf-8"?>
-<p:sld xmlns:a="http://schemas.openxmlformats.org/drawingml/2006/main" xmlns:r="http://schemas.openxmlformats.org/officeDocument/2006/relationships" xmlns:p="http://schemas.openxmlformats.org/presentationml/2006/main">
-  <p:cSld>
-    <p:spTree>
-      <p:nvGrpSpPr>
-        <p:cNvPr id="1" name=""/>
-        <p:cNvGrpSpPr/>
-        <p:nvPr/>
-      </p:nvGrpSpPr>
-      <p:grpSpPr>
-        <a:xfrm>
-          <a:off x="0" y="0"/>
-          <a:ext cx="0" cy="0"/>
-          <a:chOff x="0" y="0"/>
-          <a:chExt cx="0" cy="0"/>
-        </a:xfrm>
-      </p:grpSpPr>
-      <p:sp>
-        <p:nvSpPr>
-          <p:cNvPr id="3" name="Rectangle 2"/>
-          <p:cNvSpPr/>
-          <p:nvPr/>
-        </p:nvSpPr>
-        <p:spPr bwMode="auto">
-          <a:xfrm>
-            <a:off x="0" y="0"/>
-            <a:ext cx="12192000" cy="6858000"/>
-          </a:xfrm>
-          <a:prstGeom prst="rect">
-            <a:avLst/>
-          </a:prstGeom>
-          <a:noFill/>
-          <a:ln w="12700">
-            <a:noFill/>
-            <a:miter lim="800000"/>
-            <a:headEnd type="none" w="med" len="med"/>
-            <a:tailEnd type="none" w="med" len="med"/>
-          </a:ln>
-          <a:effectLst/>
-        </p:spPr>
-        <p:style>
-          <a:lnRef idx="1">
-            <a:schemeClr val="accent2"/>
-          </a:lnRef>
-          <a:fillRef idx="3">
-            <a:schemeClr val="accent2"/>
-          </a:fillRef>
-          <a:effectRef idx="2">
-            <a:schemeClr val="accent2"/>
-          </a:effectRef>
-          <a:fontRef idx="minor">
-            <a:schemeClr val="lt1"/>
-          </a:fontRef>
-        </p:style>
-        <p:txBody>
-          <a:bodyPr rot="0" spcFirstLastPara="0" vertOverflow="overflow" horzOverflow="overflow" vert="horz" wrap="square" lIns="182880" tIns="146304" rIns="182880" bIns="146304" numCol="1" spcCol="0" rtlCol="0" fromWordArt="0" anchor="ctr" anchorCtr="0" forceAA="0" compatLnSpc="1">
-            <a:prstTxWarp prst="textNoShape">
-              <a:avLst/>
-            </a:prstTxWarp>
-            <a:noAutofit/>
-          </a:bodyPr>
-          <a:lstStyle/>
-          <a:p>
-            <a:pPr algn="ctr"/>
-            <a:r>
-              <a:rPr lang="en-US" sz="7200" dirty="0" err="1">
-                <a:solidFill>
-                  <a:srgbClr val="000000"/>
-                </a:solidFill>
-                <a:latin typeface="Consolas" panose="020B0609020204030204" pitchFamily="49" charset="0"/>
-              </a:rPr>
-              <a:t>lowerYourHands</a:t>
-            </a:r>
-            <a:r>
-              <a:rPr lang="en-US" sz="7200" dirty="0">
-                <a:solidFill>
-                  <a:srgbClr val="000000"/>
-                </a:solidFill>
-                <a:latin typeface="Consolas" panose="020B0609020204030204" pitchFamily="49" charset="0"/>
-              </a:rPr>
-              <a:t>();</a:t>
-            </a:r>
-            <a:endParaRPr lang="en-US" sz="7200" dirty="0">
-              <a:solidFill>
-                <a:srgbClr val="000000"/>
-              </a:solidFill>
-              <a:latin typeface="Consolas" panose="020B0609020204030204" pitchFamily="49" charset="0"/>
-            </a:endParaRPr>
-          </a:p>
-        </p:txBody>
-      </p:sp>
-    </p:spTree>
-    <p:extLst>
-      <p:ext uri="{BB962C8B-B14F-4D97-AF65-F5344CB8AC3E}">
-        <p14:creationId xmlns:p14="http://schemas.microsoft.com/office/powerpoint/2010/main" val="890655139"/>
-      </p:ext>
-    </p:extLst>
-  </p:cSld>
-  <p:clrMapOvr>
-    <a:masterClrMapping/>
-  </p:clrMapOvr>
-  <p:transition>
-    <p:fade/>
-  </p:transition>
-  <p:timing>
-    <p:tnLst>
-      <p:par>
-        <p:cTn id="1" dur="indefinite" restart="never" nodeType="tmRoot"/>
-      </p:par>
-    </p:tnLst>
-  </p:timing>
-</p:sld>
-</file>
-
-<file path=ppt/slides/slide18.xml><?xml version="1.0" encoding="utf-8"?>
 <p:sld xmlns:a="http://schemas.openxmlformats.org/drawingml/2006/main" xmlns:r="http://schemas.openxmlformats.org/officeDocument/2006/relationships" xmlns:p="http://schemas.openxmlformats.org/presentationml/2006/main">
   <p:cSld>
     <p:spTree>
@@ -38767,7 +38546,7 @@
 </p:sld>
 </file>
 
-<file path=ppt/slides/slide19.xml><?xml version="1.0" encoding="utf-8"?>
+<file path=ppt/slides/slide18.xml><?xml version="1.0" encoding="utf-8"?>
 <p:sld xmlns:a="http://schemas.openxmlformats.org/drawingml/2006/main" xmlns:r="http://schemas.openxmlformats.org/officeDocument/2006/relationships" xmlns:p="http://schemas.openxmlformats.org/presentationml/2006/main">
   <p:cSld>
     <p:spTree>
@@ -39028,12 +38807,6 @@
               </a:rPr>
               <a:t>alert(message);</a:t>
             </a:r>
-            <a:endParaRPr lang="en-US" sz="4800" dirty="0">
-              <a:solidFill>
-                <a:srgbClr val="000000"/>
-              </a:solidFill>
-              <a:latin typeface="Consolas" panose="020B0609020204030204" pitchFamily="49" charset="0"/>
-            </a:endParaRPr>
           </a:p>
         </p:txBody>
       </p:sp>
@@ -39999,12 +39772,6 @@
               </a:rPr>
               <a:t>);</a:t>
             </a:r>
-            <a:endParaRPr lang="en-US" sz="8000" dirty="0">
-              <a:solidFill>
-                <a:srgbClr val="000000"/>
-              </a:solidFill>
-              <a:latin typeface="Consolas" panose="020B0609020204030204" pitchFamily="49" charset="0"/>
-            </a:endParaRPr>
           </a:p>
         </p:txBody>
       </p:sp>
@@ -40225,12 +39992,6 @@
               </a:rPr>
               <a:t>}</a:t>
             </a:r>
-            <a:endParaRPr lang="en-US" sz="8000" dirty="0">
-              <a:solidFill>
-                <a:srgbClr val="000000"/>
-              </a:solidFill>
-              <a:latin typeface="Consolas" panose="020B0609020204030204" pitchFamily="49" charset="0"/>
-            </a:endParaRPr>
           </a:p>
         </p:txBody>
       </p:sp>
@@ -40423,12 +40184,6 @@
               </a:rPr>
               <a:t>);</a:t>
             </a:r>
-            <a:endParaRPr lang="en-US" sz="7200" dirty="0">
-              <a:solidFill>
-                <a:srgbClr val="000000"/>
-              </a:solidFill>
-              <a:latin typeface="Consolas" panose="020B0609020204030204" pitchFamily="49" charset="0"/>
-            </a:endParaRPr>
           </a:p>
         </p:txBody>
       </p:sp>

</xml_diff>